<commit_message>
* Updated PPT. * Added code.
</commit_message>
<xml_diff>
--- a/Week 1/Lecture - Week 1.pptx
+++ b/Week 1/Lecture - Week 1.pptx
@@ -6872,8 +6872,12 @@
           <a:lstStyle/>
           <a:p>
             <a:r>
-              <a:rPr lang="en-US" dirty="0" smtClean="0"/>
-              <a:t>Salesforce 101</a:t>
+              <a:rPr lang="en-US" smtClean="0"/>
+              <a:t>Salesforce </a:t>
+            </a:r>
+            <a:r>
+              <a:rPr lang="en-US" smtClean="0"/>
+              <a:t>201</a:t>
             </a:r>
             <a:endParaRPr lang="en-US" dirty="0"/>
           </a:p>
@@ -6912,6 +6916,13 @@
   <p:clrMapOvr>
     <a:masterClrMapping/>
   </p:clrMapOvr>
+  <p:timing>
+    <p:tnLst>
+      <p:par>
+        <p:cTn id="1" dur="indefinite" restart="never" nodeType="tmRoot"/>
+      </p:par>
+    </p:tnLst>
+  </p:timing>
 </p:sld>
 </file>
 
@@ -7083,13 +7094,8 @@
           <a:p>
             <a:r>
               <a:rPr lang="en-US" dirty="0" smtClean="0"/>
-              <a:t>Has to be unit tested 90% </a:t>
-            </a:r>
-            <a:r>
-              <a:rPr lang="en-US" smtClean="0"/>
-              <a:t>or higher.</a:t>
-            </a:r>
-            <a:endParaRPr lang="en-US" dirty="0" smtClean="0"/>
+              <a:t>Has to be unit tested 90% or higher.</a:t>
+            </a:r>
           </a:p>
           <a:p>
             <a:endParaRPr lang="en-US" dirty="0" smtClean="0"/>
@@ -7233,6 +7239,13 @@
   <p:clrMapOvr>
     <a:masterClrMapping/>
   </p:clrMapOvr>
+  <p:timing>
+    <p:tnLst>
+      <p:par>
+        <p:cTn id="1" dur="indefinite" restart="never" nodeType="tmRoot"/>
+      </p:par>
+    </p:tnLst>
+  </p:timing>
 </p:sld>
 </file>
 

</xml_diff>